<commit_message>
Final push part 2
</commit_message>
<xml_diff>
--- a/ProjectPoster.pptx
+++ b/ProjectPoster.pptx
@@ -259,7 +259,7 @@
           <a:p>
             <a:fld id="{99056184-B2CF-4086-AEA0-AE7F2EE8CE2B}" type="datetimeFigureOut">
               <a:rPr lang="en-US" smtClean="0"/>
-              <a:t>4/24/2020</a:t>
+              <a:t>4/29/2020</a:t>
             </a:fld>
             <a:endParaRPr lang="en-US"/>
           </a:p>
@@ -457,7 +457,7 @@
           <a:p>
             <a:fld id="{99056184-B2CF-4086-AEA0-AE7F2EE8CE2B}" type="datetimeFigureOut">
               <a:rPr lang="en-US" smtClean="0"/>
-              <a:t>4/24/2020</a:t>
+              <a:t>4/29/2020</a:t>
             </a:fld>
             <a:endParaRPr lang="en-US"/>
           </a:p>
@@ -665,7 +665,7 @@
           <a:p>
             <a:fld id="{99056184-B2CF-4086-AEA0-AE7F2EE8CE2B}" type="datetimeFigureOut">
               <a:rPr lang="en-US" smtClean="0"/>
-              <a:t>4/24/2020</a:t>
+              <a:t>4/29/2020</a:t>
             </a:fld>
             <a:endParaRPr lang="en-US"/>
           </a:p>
@@ -863,7 +863,7 @@
           <a:p>
             <a:fld id="{99056184-B2CF-4086-AEA0-AE7F2EE8CE2B}" type="datetimeFigureOut">
               <a:rPr lang="en-US" smtClean="0"/>
-              <a:t>4/24/2020</a:t>
+              <a:t>4/29/2020</a:t>
             </a:fld>
             <a:endParaRPr lang="en-US"/>
           </a:p>
@@ -1138,7 +1138,7 @@
           <a:p>
             <a:fld id="{99056184-B2CF-4086-AEA0-AE7F2EE8CE2B}" type="datetimeFigureOut">
               <a:rPr lang="en-US" smtClean="0"/>
-              <a:t>4/24/2020</a:t>
+              <a:t>4/29/2020</a:t>
             </a:fld>
             <a:endParaRPr lang="en-US"/>
           </a:p>
@@ -1403,7 +1403,7 @@
           <a:p>
             <a:fld id="{99056184-B2CF-4086-AEA0-AE7F2EE8CE2B}" type="datetimeFigureOut">
               <a:rPr lang="en-US" smtClean="0"/>
-              <a:t>4/24/2020</a:t>
+              <a:t>4/29/2020</a:t>
             </a:fld>
             <a:endParaRPr lang="en-US"/>
           </a:p>
@@ -1815,7 +1815,7 @@
           <a:p>
             <a:fld id="{99056184-B2CF-4086-AEA0-AE7F2EE8CE2B}" type="datetimeFigureOut">
               <a:rPr lang="en-US" smtClean="0"/>
-              <a:t>4/24/2020</a:t>
+              <a:t>4/29/2020</a:t>
             </a:fld>
             <a:endParaRPr lang="en-US"/>
           </a:p>
@@ -1956,7 +1956,7 @@
           <a:p>
             <a:fld id="{99056184-B2CF-4086-AEA0-AE7F2EE8CE2B}" type="datetimeFigureOut">
               <a:rPr lang="en-US" smtClean="0"/>
-              <a:t>4/24/2020</a:t>
+              <a:t>4/29/2020</a:t>
             </a:fld>
             <a:endParaRPr lang="en-US"/>
           </a:p>
@@ -2069,7 +2069,7 @@
           <a:p>
             <a:fld id="{99056184-B2CF-4086-AEA0-AE7F2EE8CE2B}" type="datetimeFigureOut">
               <a:rPr lang="en-US" smtClean="0"/>
-              <a:t>4/24/2020</a:t>
+              <a:t>4/29/2020</a:t>
             </a:fld>
             <a:endParaRPr lang="en-US"/>
           </a:p>
@@ -2380,7 +2380,7 @@
           <a:p>
             <a:fld id="{99056184-B2CF-4086-AEA0-AE7F2EE8CE2B}" type="datetimeFigureOut">
               <a:rPr lang="en-US" smtClean="0"/>
-              <a:t>4/24/2020</a:t>
+              <a:t>4/29/2020</a:t>
             </a:fld>
             <a:endParaRPr lang="en-US"/>
           </a:p>
@@ -2668,7 +2668,7 @@
           <a:p>
             <a:fld id="{99056184-B2CF-4086-AEA0-AE7F2EE8CE2B}" type="datetimeFigureOut">
               <a:rPr lang="en-US" smtClean="0"/>
-              <a:t>4/24/2020</a:t>
+              <a:t>4/29/2020</a:t>
             </a:fld>
             <a:endParaRPr lang="en-US"/>
           </a:p>
@@ -2909,7 +2909,7 @@
           <a:p>
             <a:fld id="{99056184-B2CF-4086-AEA0-AE7F2EE8CE2B}" type="datetimeFigureOut">
               <a:rPr lang="en-US" smtClean="0"/>
-              <a:t>4/24/2020</a:t>
+              <a:t>4/29/2020</a:t>
             </a:fld>
             <a:endParaRPr lang="en-US"/>
           </a:p>
@@ -3476,7 +3476,7 @@
         <p:spPr>
           <a:xfrm>
             <a:off x="1326616" y="62911"/>
-            <a:ext cx="9233967" cy="600164"/>
+            <a:ext cx="9233967" cy="507831"/>
           </a:xfrm>
           <a:prstGeom prst="rect">
             <a:avLst/>
@@ -3491,15 +3491,13 @@
           <a:p>
             <a:pPr algn="ctr"/>
             <a:r>
-              <a:rPr lang="en-US" sz="1100" b="1" u="sng" dirty="0">
+              <a:rPr lang="en-US" sz="1600" b="1" u="sng" dirty="0">
                 <a:latin typeface="Times New Roman" panose="02020603050405020304" pitchFamily="18" charset="0"/>
                 <a:cs typeface="Times New Roman" panose="02020603050405020304" pitchFamily="18" charset="0"/>
               </a:rPr>
               <a:t>Replication of Unity’s Physics Engine</a:t>
             </a:r>
-          </a:p>
-          <a:p>
-            <a:endParaRPr lang="en-US" sz="1100" dirty="0">
+            <a:endParaRPr lang="en-US" sz="1400" dirty="0">
               <a:latin typeface="Times New Roman" panose="02020603050405020304" pitchFamily="18" charset="0"/>
               <a:cs typeface="Times New Roman" panose="02020603050405020304" pitchFamily="18" charset="0"/>
             </a:endParaRPr>
@@ -3577,7 +3575,7 @@
             </a:r>
             <a:endParaRPr lang="en-US" sz="1400" dirty="0">
               <a:effectLst/>
-              <a:latin typeface="Calibri" panose="020F0502020204030204" pitchFamily="34" charset="0"/>
+              <a:latin typeface="Times New Roman" panose="02020603050405020304" pitchFamily="18" charset="0"/>
               <a:ea typeface="Calibri" panose="020F0502020204030204" pitchFamily="34" charset="0"/>
               <a:cs typeface="Times New Roman" panose="02020603050405020304" pitchFamily="18" charset="0"/>
             </a:endParaRPr>
@@ -3600,8 +3598,8 @@
         </p:nvSpPr>
         <p:spPr bwMode="auto">
           <a:xfrm>
-            <a:off x="-631293" y="1226008"/>
-            <a:ext cx="3623021" cy="667245"/>
+            <a:off x="-617229" y="1226008"/>
+            <a:ext cx="3608957" cy="693288"/>
           </a:xfrm>
           <a:prstGeom prst="rect">
             <a:avLst/>
@@ -3636,7 +3634,7 @@
               </a:spcAft>
             </a:pPr>
             <a:r>
-              <a:rPr lang="en-US" sz="900" dirty="0">
+              <a:rPr lang="en-US" sz="1000" dirty="0">
                 <a:effectLst/>
                 <a:latin typeface="Times New Roman" panose="02020603050405020304" pitchFamily="18" charset="0"/>
                 <a:ea typeface="Calibri" panose="020F0502020204030204" pitchFamily="34" charset="0"/>
@@ -3658,7 +3656,7 @@
               </a:spcAft>
             </a:pPr>
             <a:r>
-              <a:rPr lang="en-US" sz="900" dirty="0">
+              <a:rPr lang="en-US" sz="1000" dirty="0">
                 <a:effectLst/>
                 <a:latin typeface="Calibri" panose="020F0502020204030204" pitchFamily="34" charset="0"/>
                 <a:ea typeface="Calibri" panose="020F0502020204030204" pitchFamily="34" charset="0"/>
@@ -3685,8 +3683,8 @@
         </p:nvSpPr>
         <p:spPr bwMode="auto">
           <a:xfrm>
-            <a:off x="-634809" y="2087744"/>
-            <a:ext cx="3623020" cy="260939"/>
+            <a:off x="-617229" y="1994113"/>
+            <a:ext cx="3602307" cy="316329"/>
           </a:xfrm>
           <a:prstGeom prst="rect">
             <a:avLst/>
@@ -3749,17 +3747,17 @@
               </a:spcAft>
             </a:pPr>
             <a:r>
-              <a:rPr lang="en-US" sz="1800" b="1" dirty="0">
+              <a:rPr lang="en-US" sz="1400" b="1" dirty="0">
                 <a:effectLst/>
-                <a:latin typeface="Calibri" panose="020F0502020204030204" pitchFamily="34" charset="0"/>
+                <a:latin typeface="Times New Roman" panose="02020603050405020304" pitchFamily="18" charset="0"/>
                 <a:ea typeface="Calibri" panose="020F0502020204030204" pitchFamily="34" charset="0"/>
                 <a:cs typeface="Times New Roman" panose="02020603050405020304" pitchFamily="18" charset="0"/>
               </a:rPr>
               <a:t> </a:t>
             </a:r>
-            <a:endParaRPr lang="en-US" sz="1100" dirty="0">
+            <a:endParaRPr lang="en-US" sz="1400" dirty="0">
               <a:effectLst/>
-              <a:latin typeface="Calibri" panose="020F0502020204030204" pitchFamily="34" charset="0"/>
+              <a:latin typeface="Times New Roman" panose="02020603050405020304" pitchFamily="18" charset="0"/>
               <a:ea typeface="Calibri" panose="020F0502020204030204" pitchFamily="34" charset="0"/>
               <a:cs typeface="Times New Roman" panose="02020603050405020304" pitchFamily="18" charset="0"/>
             </a:endParaRPr>
@@ -3782,8 +3780,8 @@
         </p:nvSpPr>
         <p:spPr bwMode="auto">
           <a:xfrm>
-            <a:off x="-627777" y="2416841"/>
-            <a:ext cx="3615988" cy="980086"/>
+            <a:off x="-614097" y="2364211"/>
+            <a:ext cx="3602308" cy="1340120"/>
           </a:xfrm>
           <a:prstGeom prst="rect">
             <a:avLst/>
@@ -3818,15 +3816,23 @@
               </a:spcAft>
             </a:pPr>
             <a:r>
-              <a:rPr lang="en-US" sz="900" dirty="0">
+              <a:rPr lang="en-US" sz="1000" dirty="0">
                 <a:effectLst/>
                 <a:latin typeface="Times New Roman" panose="02020603050405020304" pitchFamily="18" charset="0"/>
                 <a:ea typeface="Calibri" panose="020F0502020204030204" pitchFamily="34" charset="0"/>
                 <a:cs typeface="Times New Roman" panose="02020603050405020304" pitchFamily="18" charset="0"/>
               </a:rPr>
-              <a:t>Unity’s physics engine allows for thousands of objects to be handled in a single frame (less than a second). This handling involves adding forces (friction, gravity, etc.), collision computations, and other calculations. In my research I didn’t expect to be able to handle so many objects, but rather I set out to have a better understanding of the processes behind Unity’s physics that are often ignored.</a:t>
-            </a:r>
-            <a:endParaRPr lang="en-US" sz="900" dirty="0">
+              <a:t>Unity’s physics engine allows for thousands of objects to be handled in a single frame (less than a second). This handling involves adding forces (friction, gravity, etc.), collision computations, and other calculations. Many of these processes happen without the developer knowing what exactly is going on and the effects it will have on the game they are creating. </a:t>
+            </a:r>
+            <a:r>
+              <a:rPr lang="en-US" sz="1000" dirty="0">
+                <a:latin typeface="Times New Roman" panose="02020603050405020304" pitchFamily="18" charset="0"/>
+                <a:ea typeface="Calibri" panose="020F0502020204030204" pitchFamily="34" charset="0"/>
+                <a:cs typeface="Times New Roman" panose="02020603050405020304" pitchFamily="18" charset="0"/>
+              </a:rPr>
+              <a:t>In recreating this, I gained insight in how the Unity Engine handles complex physics operations.</a:t>
+            </a:r>
+            <a:endParaRPr lang="en-US" sz="1000" dirty="0">
               <a:effectLst/>
               <a:latin typeface="Calibri" panose="020F0502020204030204" pitchFamily="34" charset="0"/>
               <a:ea typeface="Calibri" panose="020F0502020204030204" pitchFamily="34" charset="0"/>
@@ -3897,7 +3903,7 @@
             </a:r>
             <a:endParaRPr lang="en-US" sz="1400" dirty="0">
               <a:effectLst/>
-              <a:latin typeface="Calibri" panose="020F0502020204030204" pitchFamily="34" charset="0"/>
+              <a:latin typeface="Times New Roman" panose="02020603050405020304" pitchFamily="18" charset="0"/>
               <a:ea typeface="Calibri" panose="020F0502020204030204" pitchFamily="34" charset="0"/>
               <a:cs typeface="Times New Roman" panose="02020603050405020304" pitchFamily="18" charset="0"/>
             </a:endParaRPr>
@@ -3966,7 +3972,7 @@
             </a:r>
             <a:endParaRPr lang="en-US" sz="1400" dirty="0">
               <a:effectLst/>
-              <a:latin typeface="Calibri" panose="020F0502020204030204" pitchFamily="34" charset="0"/>
+              <a:latin typeface="Times New Roman" panose="02020603050405020304" pitchFamily="18" charset="0"/>
               <a:ea typeface="Calibri" panose="020F0502020204030204" pitchFamily="34" charset="0"/>
               <a:cs typeface="Times New Roman" panose="02020603050405020304" pitchFamily="18" charset="0"/>
             </a:endParaRPr>
@@ -4014,9 +4020,46 @@
           <a:lstStyle/>
           <a:p>
             <a:pPr marL="0" marR="0">
-              <a:lnSpc>
-                <a:spcPct val="107000"/>
-              </a:lnSpc>
+              <a:spcBef>
+                <a:spcPts val="0"/>
+              </a:spcBef>
+            </a:pPr>
+            <a:r>
+              <a:rPr lang="en-US" sz="1000" dirty="0">
+                <a:effectLst/>
+                <a:latin typeface="Times New Roman" panose="02020603050405020304" pitchFamily="18" charset="0"/>
+                <a:ea typeface="Calibri" panose="020F0502020204030204" pitchFamily="34" charset="0"/>
+                <a:cs typeface="Times New Roman" panose="02020603050405020304" pitchFamily="18" charset="0"/>
+              </a:rPr>
+              <a:t>The first environment I created was a simple 5 ball max collision simulator. Users can enter different values that allow for changes in the environment and watch how Unity handles the collision versus how my physics engine handles the collision. My simulation is almost identical to Unity’s with no significant drop in frame rate.</a:t>
+            </a:r>
+          </a:p>
+          <a:p>
+            <a:pPr marL="0" marR="0">
+              <a:spcBef>
+                <a:spcPts val="0"/>
+              </a:spcBef>
+            </a:pPr>
+            <a:endParaRPr lang="en-US" sz="1000" dirty="0">
+              <a:latin typeface="Times New Roman" panose="02020603050405020304" pitchFamily="18" charset="0"/>
+              <a:ea typeface="Calibri" panose="020F0502020204030204" pitchFamily="34" charset="0"/>
+              <a:cs typeface="Times New Roman" panose="02020603050405020304" pitchFamily="18" charset="0"/>
+            </a:endParaRPr>
+          </a:p>
+          <a:p>
+            <a:pPr marL="0" marR="0">
+              <a:spcBef>
+                <a:spcPts val="0"/>
+              </a:spcBef>
+            </a:pPr>
+            <a:endParaRPr lang="en-US" sz="1000" dirty="0">
+              <a:latin typeface="Times New Roman" panose="02020603050405020304" pitchFamily="18" charset="0"/>
+              <a:ea typeface="Calibri" panose="020F0502020204030204" pitchFamily="34" charset="0"/>
+              <a:cs typeface="Times New Roman" panose="02020603050405020304" pitchFamily="18" charset="0"/>
+            </a:endParaRPr>
+          </a:p>
+          <a:p>
+            <a:pPr marL="0" marR="0">
               <a:spcBef>
                 <a:spcPts val="0"/>
               </a:spcBef>
@@ -4025,20 +4068,66 @@
               </a:spcAft>
             </a:pPr>
             <a:r>
-              <a:rPr lang="en-US" sz="900" dirty="0">
-                <a:effectLst/>
+              <a:rPr lang="en-US" sz="1000" dirty="0">
                 <a:latin typeface="Times New Roman" panose="02020603050405020304" pitchFamily="18" charset="0"/>
                 <a:ea typeface="Calibri" panose="020F0502020204030204" pitchFamily="34" charset="0"/>
                 <a:cs typeface="Times New Roman" panose="02020603050405020304" pitchFamily="18" charset="0"/>
               </a:rPr>
-              <a:t>The first environment I created was a simple 4 ball max elastic collision simulator. Users can enter different values that allow for changes in the environment and watch how Unity handles the collision versus how my physics engine handles the collision. My simulation is almost identical to Unity’s with no significant drop in frame rate.</a:t>
+              <a:t>The second environment was a gravity simulation. Two balls drop one using Unity’s engine one using my engine. Distinction in distance can be seen with a darkening blue color. By using the gravity constant 9.87m/s and a built-in variable </a:t>
+            </a:r>
+            <a:r>
+              <a:rPr lang="en-US" sz="1000" dirty="0" err="1">
+                <a:latin typeface="Times New Roman" panose="02020603050405020304" pitchFamily="18" charset="0"/>
+                <a:ea typeface="Calibri" panose="020F0502020204030204" pitchFamily="34" charset="0"/>
+                <a:cs typeface="Times New Roman" panose="02020603050405020304" pitchFamily="18" charset="0"/>
+              </a:rPr>
+              <a:t>Time.deltaTime</a:t>
+            </a:r>
+            <a:r>
+              <a:rPr lang="en-US" sz="1000" dirty="0">
+                <a:latin typeface="Times New Roman" panose="02020603050405020304" pitchFamily="18" charset="0"/>
+                <a:ea typeface="Calibri" panose="020F0502020204030204" pitchFamily="34" charset="0"/>
+                <a:cs typeface="Times New Roman" panose="02020603050405020304" pitchFamily="18" charset="0"/>
+              </a:rPr>
+              <a:t> to account for changes in frame rate the two balls fall in near perfect sync.</a:t>
             </a:r>
           </a:p>
           <a:p>
             <a:pPr marL="0" marR="0">
-              <a:lnSpc>
-                <a:spcPct val="107000"/>
-              </a:lnSpc>
+              <a:spcBef>
+                <a:spcPts val="0"/>
+              </a:spcBef>
+            </a:pPr>
+            <a:endParaRPr lang="en-US" sz="1000" dirty="0">
+              <a:latin typeface="Times New Roman" panose="02020603050405020304" pitchFamily="18" charset="0"/>
+              <a:ea typeface="Calibri" panose="020F0502020204030204" pitchFamily="34" charset="0"/>
+              <a:cs typeface="Times New Roman" panose="02020603050405020304" pitchFamily="18" charset="0"/>
+            </a:endParaRPr>
+          </a:p>
+          <a:p>
+            <a:r>
+              <a:rPr lang="en-US" sz="1000" dirty="0">
+                <a:latin typeface="Times New Roman" panose="02020603050405020304" pitchFamily="18" charset="0"/>
+                <a:ea typeface="Calibri" panose="020F0502020204030204" pitchFamily="34" charset="0"/>
+                <a:cs typeface="Times New Roman" panose="02020603050405020304" pitchFamily="18" charset="0"/>
+              </a:rPr>
+              <a:t>The final environment </a:t>
+            </a:r>
+            <a:r>
+              <a:rPr lang="en-US" sz="1000" dirty="0">
+                <a:latin typeface="Times New Roman" panose="02020603050405020304" pitchFamily="18" charset="0"/>
+                <a:cs typeface="Times New Roman" panose="02020603050405020304" pitchFamily="18" charset="0"/>
+              </a:rPr>
+              <a:t>I set up was to allow as many objects as the user wants in order to maximize the amount of collisions until the frame rate dropped to essentially 0. Unity would start to drop frames and inaccurately calculate collisions at around 1000 objects. My engine was able to get to around 50 before doing the same. </a:t>
+            </a:r>
+            <a:endParaRPr lang="en-US" sz="1000" dirty="0">
+              <a:latin typeface="Times New Roman" panose="02020603050405020304" pitchFamily="18" charset="0"/>
+              <a:ea typeface="Calibri" panose="020F0502020204030204" pitchFamily="34" charset="0"/>
+              <a:cs typeface="Times New Roman" panose="02020603050405020304" pitchFamily="18" charset="0"/>
+            </a:endParaRPr>
+          </a:p>
+          <a:p>
+            <a:pPr marL="0" marR="0">
               <a:spcBef>
                 <a:spcPts val="0"/>
               </a:spcBef>
@@ -4046,173 +4135,7 @@
                 <a:spcPts val="800"/>
               </a:spcAft>
             </a:pPr>
-            <a:endParaRPr lang="en-US" sz="900" dirty="0">
-              <a:latin typeface="Times New Roman" panose="02020603050405020304" pitchFamily="18" charset="0"/>
-              <a:ea typeface="Calibri" panose="020F0502020204030204" pitchFamily="34" charset="0"/>
-              <a:cs typeface="Times New Roman" panose="02020603050405020304" pitchFamily="18" charset="0"/>
-            </a:endParaRPr>
-          </a:p>
-          <a:p>
-            <a:pPr marL="0" marR="0">
-              <a:lnSpc>
-                <a:spcPct val="107000"/>
-              </a:lnSpc>
-              <a:spcBef>
-                <a:spcPts val="0"/>
-              </a:spcBef>
-              <a:spcAft>
-                <a:spcPts val="800"/>
-              </a:spcAft>
-            </a:pPr>
-            <a:endParaRPr lang="en-US" sz="900" dirty="0">
-              <a:latin typeface="Times New Roman" panose="02020603050405020304" pitchFamily="18" charset="0"/>
-              <a:ea typeface="Calibri" panose="020F0502020204030204" pitchFamily="34" charset="0"/>
-              <a:cs typeface="Times New Roman" panose="02020603050405020304" pitchFamily="18" charset="0"/>
-            </a:endParaRPr>
-          </a:p>
-          <a:p>
-            <a:pPr marL="0" marR="0">
-              <a:lnSpc>
-                <a:spcPct val="107000"/>
-              </a:lnSpc>
-              <a:spcBef>
-                <a:spcPts val="0"/>
-              </a:spcBef>
-              <a:spcAft>
-                <a:spcPts val="800"/>
-              </a:spcAft>
-            </a:pPr>
-            <a:r>
-              <a:rPr lang="en-US" sz="900" dirty="0">
-                <a:latin typeface="Times New Roman" panose="02020603050405020304" pitchFamily="18" charset="0"/>
-                <a:ea typeface="Calibri" panose="020F0502020204030204" pitchFamily="34" charset="0"/>
-                <a:cs typeface="Times New Roman" panose="02020603050405020304" pitchFamily="18" charset="0"/>
-              </a:rPr>
-              <a:t>The second environment was a gravity tester. Two balls drop one using Unity’s engine one using my engine. Distinction in distance can be seen with a darkening color. Although they don’t line up perfectly my algorithm utilizes gravity constant and terminal velocity to create a realistic fall.</a:t>
-            </a:r>
-            <a:endParaRPr lang="en-US" sz="900" dirty="0">
-              <a:effectLst/>
-              <a:latin typeface="Times New Roman" panose="02020603050405020304" pitchFamily="18" charset="0"/>
-              <a:ea typeface="Calibri" panose="020F0502020204030204" pitchFamily="34" charset="0"/>
-              <a:cs typeface="Times New Roman" panose="02020603050405020304" pitchFamily="18" charset="0"/>
-            </a:endParaRPr>
-          </a:p>
-          <a:p>
-            <a:pPr marL="0" marR="0">
-              <a:lnSpc>
-                <a:spcPct val="107000"/>
-              </a:lnSpc>
-              <a:spcBef>
-                <a:spcPts val="0"/>
-              </a:spcBef>
-              <a:spcAft>
-                <a:spcPts val="800"/>
-              </a:spcAft>
-            </a:pPr>
-            <a:endParaRPr lang="en-US" sz="900" dirty="0">
-              <a:latin typeface="Times New Roman" panose="02020603050405020304" pitchFamily="18" charset="0"/>
-              <a:ea typeface="Calibri" panose="020F0502020204030204" pitchFamily="34" charset="0"/>
-              <a:cs typeface="Times New Roman" panose="02020603050405020304" pitchFamily="18" charset="0"/>
-            </a:endParaRPr>
-          </a:p>
-          <a:p>
-            <a:pPr marL="0" marR="0">
-              <a:lnSpc>
-                <a:spcPct val="107000"/>
-              </a:lnSpc>
-              <a:spcBef>
-                <a:spcPts val="0"/>
-              </a:spcBef>
-              <a:spcAft>
-                <a:spcPts val="800"/>
-              </a:spcAft>
-            </a:pPr>
-            <a:endParaRPr lang="en-US" sz="900" dirty="0">
-              <a:latin typeface="Times New Roman" panose="02020603050405020304" pitchFamily="18" charset="0"/>
-              <a:ea typeface="Calibri" panose="020F0502020204030204" pitchFamily="34" charset="0"/>
-              <a:cs typeface="Times New Roman" panose="02020603050405020304" pitchFamily="18" charset="0"/>
-            </a:endParaRPr>
-          </a:p>
-          <a:p>
-            <a:pPr>
-              <a:lnSpc>
-                <a:spcPct val="107000"/>
-              </a:lnSpc>
-              <a:spcAft>
-                <a:spcPts val="800"/>
-              </a:spcAft>
-            </a:pPr>
-            <a:r>
-              <a:rPr lang="en-US" sz="900" dirty="0">
-                <a:latin typeface="Times New Roman" panose="02020603050405020304" pitchFamily="18" charset="0"/>
-                <a:ea typeface="Calibri" panose="020F0502020204030204" pitchFamily="34" charset="0"/>
-                <a:cs typeface="Times New Roman" panose="02020603050405020304" pitchFamily="18" charset="0"/>
-              </a:rPr>
-              <a:t>The final environment </a:t>
-            </a:r>
-            <a:r>
-              <a:rPr lang="en-US" sz="900" dirty="0">
-                <a:latin typeface="Times New Roman" panose="02020603050405020304" pitchFamily="18" charset="0"/>
-                <a:cs typeface="Times New Roman" panose="02020603050405020304" pitchFamily="18" charset="0"/>
-              </a:rPr>
-              <a:t>I set up was to allow as many objects as the user wants in order to maximize the amount of collisions that could be set up until the frame rate dropped to essentially 0. At around 1000 balls Unity would start to drop frames and inaccurately calculate collisions. My engine was able to get to around 50 before doing the same.</a:t>
-            </a:r>
-            <a:endParaRPr lang="en-US" sz="900" dirty="0">
-              <a:latin typeface="Times New Roman" panose="02020603050405020304" pitchFamily="18" charset="0"/>
-              <a:ea typeface="Calibri" panose="020F0502020204030204" pitchFamily="34" charset="0"/>
-              <a:cs typeface="Times New Roman" panose="02020603050405020304" pitchFamily="18" charset="0"/>
-            </a:endParaRPr>
-          </a:p>
-          <a:p>
-            <a:pPr marL="0" marR="0">
-              <a:lnSpc>
-                <a:spcPct val="107000"/>
-              </a:lnSpc>
-              <a:spcBef>
-                <a:spcPts val="0"/>
-              </a:spcBef>
-              <a:spcAft>
-                <a:spcPts val="800"/>
-              </a:spcAft>
-            </a:pPr>
-            <a:endParaRPr lang="en-US" sz="900" dirty="0">
-              <a:effectLst/>
-              <a:latin typeface="Times New Roman" panose="02020603050405020304" pitchFamily="18" charset="0"/>
-              <a:ea typeface="Calibri" panose="020F0502020204030204" pitchFamily="34" charset="0"/>
-              <a:cs typeface="Times New Roman" panose="02020603050405020304" pitchFamily="18" charset="0"/>
-            </a:endParaRPr>
-          </a:p>
-          <a:p>
-            <a:pPr marL="0" marR="0">
-              <a:lnSpc>
-                <a:spcPct val="107000"/>
-              </a:lnSpc>
-              <a:spcBef>
-                <a:spcPts val="0"/>
-              </a:spcBef>
-              <a:spcAft>
-                <a:spcPts val="800"/>
-              </a:spcAft>
-            </a:pPr>
-            <a:endParaRPr lang="en-US" sz="900" dirty="0">
-              <a:latin typeface="Times New Roman" panose="02020603050405020304" pitchFamily="18" charset="0"/>
-              <a:ea typeface="Calibri" panose="020F0502020204030204" pitchFamily="34" charset="0"/>
-              <a:cs typeface="Times New Roman" panose="02020603050405020304" pitchFamily="18" charset="0"/>
-            </a:endParaRPr>
-          </a:p>
-          <a:p>
-            <a:pPr marL="0" marR="0">
-              <a:lnSpc>
-                <a:spcPct val="107000"/>
-              </a:lnSpc>
-              <a:spcBef>
-                <a:spcPts val="0"/>
-              </a:spcBef>
-              <a:spcAft>
-                <a:spcPts val="800"/>
-              </a:spcAft>
-            </a:pPr>
-            <a:endParaRPr lang="en-US" sz="900" dirty="0">
+            <a:endParaRPr lang="en-US" sz="1000" dirty="0">
               <a:latin typeface="Times New Roman" panose="02020603050405020304" pitchFamily="18" charset="0"/>
               <a:ea typeface="Calibri" panose="020F0502020204030204" pitchFamily="34" charset="0"/>
               <a:cs typeface="Times New Roman" panose="02020603050405020304" pitchFamily="18" charset="0"/>
@@ -4275,8 +4198,8 @@
         </p:nvSpPr>
         <p:spPr bwMode="auto">
           <a:xfrm>
-            <a:off x="8545631" y="1237598"/>
-            <a:ext cx="3608956" cy="3766048"/>
+            <a:off x="8545631" y="1237597"/>
+            <a:ext cx="3608956" cy="3985559"/>
           </a:xfrm>
           <a:prstGeom prst="rect">
             <a:avLst/>
@@ -4311,7 +4234,7 @@
               </a:spcAft>
             </a:pPr>
             <a:r>
-              <a:rPr lang="en-US" sz="900" dirty="0">
+              <a:rPr lang="en-US" sz="1000" dirty="0">
                 <a:effectLst/>
                 <a:latin typeface="Times New Roman" panose="02020603050405020304" pitchFamily="18" charset="0"/>
                 <a:ea typeface="Calibri" panose="020F0502020204030204" pitchFamily="34" charset="0"/>
@@ -4332,7 +4255,7 @@
                 <a:spcPts val="800"/>
               </a:spcAft>
             </a:pPr>
-            <a:endParaRPr lang="en-US" sz="900" dirty="0">
+            <a:endParaRPr lang="en-US" sz="1000" dirty="0">
               <a:latin typeface="Times New Roman" panose="02020603050405020304" pitchFamily="18" charset="0"/>
               <a:ea typeface="Calibri" panose="020F0502020204030204" pitchFamily="34" charset="0"/>
               <a:cs typeface="Times New Roman" panose="02020603050405020304" pitchFamily="18" charset="0"/>
@@ -4350,7 +4273,15 @@
                 <a:spcPts val="800"/>
               </a:spcAft>
             </a:pPr>
-            <a:endParaRPr lang="en-US" sz="900" dirty="0">
+            <a:r>
+              <a:rPr lang="en-US" sz="1000" dirty="0">
+                <a:latin typeface="Times New Roman" panose="02020603050405020304" pitchFamily="18" charset="0"/>
+                <a:ea typeface="Calibri" panose="020F0502020204030204" pitchFamily="34" charset="0"/>
+                <a:cs typeface="Times New Roman" panose="02020603050405020304" pitchFamily="18" charset="0"/>
+              </a:rPr>
+              <a:t>The issue with this is that if Object 1 collides with Object 2, Object 1 computes its velocity based on Objects 2 velocity and then updates its velocity. When Object 2’s update is called it is now calculating it’s new velocity on Object 1’s already updated velocity. Hence, Object 2’s new velocity is wrong.</a:t>
+            </a:r>
+            <a:endParaRPr lang="en-US" sz="1000" dirty="0">
               <a:effectLst/>
               <a:latin typeface="Times New Roman" panose="02020603050405020304" pitchFamily="18" charset="0"/>
               <a:ea typeface="Calibri" panose="020F0502020204030204" pitchFamily="34" charset="0"/>
@@ -4370,19 +4301,13 @@
               </a:spcAft>
             </a:pPr>
             <a:r>
-              <a:rPr lang="en-US" sz="900" dirty="0">
+              <a:rPr lang="en-US" sz="1000" dirty="0">
                 <a:latin typeface="Times New Roman" panose="02020603050405020304" pitchFamily="18" charset="0"/>
                 <a:ea typeface="Calibri" panose="020F0502020204030204" pitchFamily="34" charset="0"/>
                 <a:cs typeface="Times New Roman" panose="02020603050405020304" pitchFamily="18" charset="0"/>
               </a:rPr>
-              <a:t>The issue with this is that if Object 1 collides with Object 2, Object 1 computes its velocity based on Objects 2 velocity and then updates its velocity. When Object 2’s update is called it is now calculating it’s new velocity on Object 1’s already updated velocity. Hence, Object 2’s new velocity is wrong.</a:t>
-            </a:r>
-            <a:endParaRPr lang="en-US" sz="900" dirty="0">
-              <a:effectLst/>
-              <a:latin typeface="Times New Roman" panose="02020603050405020304" pitchFamily="18" charset="0"/>
-              <a:ea typeface="Calibri" panose="020F0502020204030204" pitchFamily="34" charset="0"/>
-              <a:cs typeface="Times New Roman" panose="02020603050405020304" pitchFamily="18" charset="0"/>
-            </a:endParaRPr>
+              <a:t>To fix this problem I utilized Unity’s built in Coroutine function. This allows for calculations to be made in the Update function and then waiting until all until all computations to be made to change values, resulting in correct collisions.</a:t>
+            </a:r>
           </a:p>
           <a:p>
             <a:pPr marL="0" marR="0">
@@ -4396,14 +4321,11 @@
                 <a:spcPts val="800"/>
               </a:spcAft>
             </a:pPr>
-            <a:r>
-              <a:rPr lang="en-US" sz="900" dirty="0">
-                <a:latin typeface="Times New Roman" panose="02020603050405020304" pitchFamily="18" charset="0"/>
-                <a:ea typeface="Calibri" panose="020F0502020204030204" pitchFamily="34" charset="0"/>
-                <a:cs typeface="Times New Roman" panose="02020603050405020304" pitchFamily="18" charset="0"/>
-              </a:rPr>
-              <a:t>To fix this problem I utilized Unity’s built in Coroutine function. This allows for calculations to be made in the Update function and using the Coroutine waiting until all updates are called to update the velocities.</a:t>
-            </a:r>
+            <a:endParaRPr lang="en-US" sz="1000" dirty="0">
+              <a:latin typeface="Times New Roman" panose="02020603050405020304" pitchFamily="18" charset="0"/>
+              <a:ea typeface="Calibri" panose="020F0502020204030204" pitchFamily="34" charset="0"/>
+              <a:cs typeface="Times New Roman" panose="02020603050405020304" pitchFamily="18" charset="0"/>
+            </a:endParaRPr>
           </a:p>
           <a:p>
             <a:pPr marL="0" marR="0">
@@ -4417,8 +4339,7 @@
                 <a:spcPts val="800"/>
               </a:spcAft>
             </a:pPr>
-            <a:endParaRPr lang="en-US" sz="900" dirty="0">
-              <a:effectLst/>
+            <a:endParaRPr lang="en-US" sz="1000" dirty="0">
               <a:latin typeface="Times New Roman" panose="02020603050405020304" pitchFamily="18" charset="0"/>
               <a:ea typeface="Calibri" panose="020F0502020204030204" pitchFamily="34" charset="0"/>
               <a:cs typeface="Times New Roman" panose="02020603050405020304" pitchFamily="18" charset="0"/>
@@ -4436,7 +4357,7 @@
                 <a:spcPts val="800"/>
               </a:spcAft>
             </a:pPr>
-            <a:endParaRPr lang="en-US" sz="900" dirty="0">
+            <a:endParaRPr lang="en-US" sz="1000" dirty="0">
               <a:latin typeface="Times New Roman" panose="02020603050405020304" pitchFamily="18" charset="0"/>
               <a:ea typeface="Calibri" panose="020F0502020204030204" pitchFamily="34" charset="0"/>
               <a:cs typeface="Times New Roman" panose="02020603050405020304" pitchFamily="18" charset="0"/>
@@ -4454,31 +4375,14 @@
                 <a:spcPts val="800"/>
               </a:spcAft>
             </a:pPr>
-            <a:endParaRPr lang="en-US" sz="900" dirty="0">
-              <a:effectLst/>
-              <a:latin typeface="Times New Roman" panose="02020603050405020304" pitchFamily="18" charset="0"/>
-              <a:ea typeface="Calibri" panose="020F0502020204030204" pitchFamily="34" charset="0"/>
-              <a:cs typeface="Times New Roman" panose="02020603050405020304" pitchFamily="18" charset="0"/>
-            </a:endParaRPr>
-          </a:p>
-          <a:p>
-            <a:pPr marL="0" marR="0">
-              <a:lnSpc>
-                <a:spcPct val="107000"/>
-              </a:lnSpc>
-              <a:spcBef>
-                <a:spcPts val="0"/>
-              </a:spcBef>
-              <a:spcAft>
-                <a:spcPts val="800"/>
-              </a:spcAft>
-            </a:pPr>
-            <a:endParaRPr lang="en-US" sz="900" dirty="0">
-              <a:effectLst/>
-              <a:latin typeface="Times New Roman" panose="02020603050405020304" pitchFamily="18" charset="0"/>
-              <a:ea typeface="Calibri" panose="020F0502020204030204" pitchFamily="34" charset="0"/>
-              <a:cs typeface="Times New Roman" panose="02020603050405020304" pitchFamily="18" charset="0"/>
-            </a:endParaRPr>
+            <a:r>
+              <a:rPr lang="en-US" sz="1000" dirty="0">
+                <a:latin typeface="Times New Roman" panose="02020603050405020304" pitchFamily="18" charset="0"/>
+                <a:ea typeface="Calibri" panose="020F0502020204030204" pitchFamily="34" charset="0"/>
+                <a:cs typeface="Times New Roman" panose="02020603050405020304" pitchFamily="18" charset="0"/>
+              </a:rPr>
+              <a:t>Before the Coroutines two objects would likely get stuck inside one another, but by using the Coroutine this problem no longer happens.</a:t>
+            </a:r>
           </a:p>
         </p:txBody>
       </p:sp>
@@ -4498,8 +4402,8 @@
         </p:nvSpPr>
         <p:spPr bwMode="auto">
           <a:xfrm>
-            <a:off x="-634809" y="3606113"/>
-            <a:ext cx="3623020" cy="260939"/>
+            <a:off x="-617229" y="3796689"/>
+            <a:ext cx="3602308" cy="260939"/>
           </a:xfrm>
           <a:prstGeom prst="rect">
             <a:avLst/>
@@ -4562,17 +4466,17 @@
               </a:spcAft>
             </a:pPr>
             <a:r>
-              <a:rPr lang="en-US" sz="1800" b="1" dirty="0">
+              <a:rPr lang="en-US" sz="1400" b="1" dirty="0">
                 <a:effectLst/>
-                <a:latin typeface="Calibri" panose="020F0502020204030204" pitchFamily="34" charset="0"/>
+                <a:latin typeface="Times New Roman" panose="02020603050405020304" pitchFamily="18" charset="0"/>
                 <a:ea typeface="Calibri" panose="020F0502020204030204" pitchFamily="34" charset="0"/>
                 <a:cs typeface="Times New Roman" panose="02020603050405020304" pitchFamily="18" charset="0"/>
               </a:rPr>
               <a:t> </a:t>
             </a:r>
-            <a:endParaRPr lang="en-US" sz="1100" dirty="0">
+            <a:endParaRPr lang="en-US" sz="1400" dirty="0">
               <a:effectLst/>
-              <a:latin typeface="Calibri" panose="020F0502020204030204" pitchFamily="34" charset="0"/>
+              <a:latin typeface="Times New Roman" panose="02020603050405020304" pitchFamily="18" charset="0"/>
               <a:ea typeface="Calibri" panose="020F0502020204030204" pitchFamily="34" charset="0"/>
               <a:cs typeface="Times New Roman" panose="02020603050405020304" pitchFamily="18" charset="0"/>
             </a:endParaRPr>
@@ -4593,10 +4497,10 @@
         </p:nvGrpSpPr>
         <p:grpSpPr>
           <a:xfrm>
-            <a:off x="-617229" y="3953573"/>
-            <a:ext cx="3605440" cy="1150348"/>
-            <a:chOff x="-631293" y="5361740"/>
-            <a:chExt cx="3605440" cy="1634912"/>
+            <a:off x="-617229" y="4111397"/>
+            <a:ext cx="3608957" cy="1150348"/>
+            <a:chOff x="-648942" y="5361740"/>
+            <a:chExt cx="3623089" cy="1634912"/>
           </a:xfrm>
         </p:grpSpPr>
         <p:sp>
@@ -4615,8 +4519,8 @@
           </p:nvSpPr>
           <p:spPr bwMode="auto">
             <a:xfrm>
-              <a:off x="-631293" y="5361740"/>
-              <a:ext cx="1807821" cy="1634912"/>
+              <a:off x="-648942" y="5361740"/>
+              <a:ext cx="1825470" cy="1634912"/>
             </a:xfrm>
             <a:prstGeom prst="rect">
               <a:avLst/>
@@ -4651,7 +4555,7 @@
                 </a:spcAft>
               </a:pPr>
               <a:r>
-                <a:rPr lang="en-US" sz="900" dirty="0">
+                <a:rPr lang="en-US" sz="1000" dirty="0">
                   <a:effectLst/>
                   <a:latin typeface="Times New Roman" panose="02020603050405020304" pitchFamily="18" charset="0"/>
                   <a:ea typeface="Calibri" panose="020F0502020204030204" pitchFamily="34" charset="0"/>
@@ -4660,7 +4564,7 @@
                 <a:t>Unity</a:t>
               </a:r>
               <a:r>
-                <a:rPr lang="en-US" sz="900" dirty="0">
+                <a:rPr lang="en-US" sz="1000" dirty="0">
                   <a:latin typeface="Times New Roman" panose="02020603050405020304" pitchFamily="18" charset="0"/>
                   <a:ea typeface="Calibri" panose="020F0502020204030204" pitchFamily="34" charset="0"/>
                   <a:cs typeface="Times New Roman" panose="02020603050405020304" pitchFamily="18" charset="0"/>
@@ -4680,7 +4584,7 @@
                 <a:buChar char="•"/>
               </a:pPr>
               <a:r>
-                <a:rPr lang="en-US" sz="900" dirty="0">
+                <a:rPr lang="en-US" sz="1000" dirty="0">
                   <a:latin typeface="Times New Roman" panose="02020603050405020304" pitchFamily="18" charset="0"/>
                   <a:ea typeface="Calibri" panose="020F0502020204030204" pitchFamily="34" charset="0"/>
                   <a:cs typeface="Times New Roman" panose="02020603050405020304" pitchFamily="18" charset="0"/>
@@ -4700,7 +4604,7 @@
                 <a:buChar char="•"/>
               </a:pPr>
               <a:r>
-                <a:rPr lang="en-US" sz="900" dirty="0">
+                <a:rPr lang="en-US" sz="1000" dirty="0">
                   <a:latin typeface="Times New Roman" panose="02020603050405020304" pitchFamily="18" charset="0"/>
                   <a:ea typeface="Calibri" panose="020F0502020204030204" pitchFamily="34" charset="0"/>
                   <a:cs typeface="Times New Roman" panose="02020603050405020304" pitchFamily="18" charset="0"/>
@@ -4720,12 +4624,12 @@
                 <a:buChar char="•"/>
               </a:pPr>
               <a:r>
-                <a:rPr lang="en-US" sz="900" dirty="0">
+                <a:rPr lang="en-US" sz="1000" dirty="0">
                   <a:latin typeface="Times New Roman" panose="02020603050405020304" pitchFamily="18" charset="0"/>
                   <a:ea typeface="Calibri" panose="020F0502020204030204" pitchFamily="34" charset="0"/>
                   <a:cs typeface="Times New Roman" panose="02020603050405020304" pitchFamily="18" charset="0"/>
                 </a:rPr>
-                <a:t>Rotation in collision</a:t>
+                <a:t>Rotation on collision</a:t>
               </a:r>
             </a:p>
             <a:p>
@@ -4740,7 +4644,7 @@
                   <a:spcPts val="800"/>
                 </a:spcAft>
               </a:pPr>
-              <a:endParaRPr lang="en-US" sz="900" dirty="0">
+              <a:endParaRPr lang="en-US" sz="1000" dirty="0">
                 <a:latin typeface="Times New Roman" panose="02020603050405020304" pitchFamily="18" charset="0"/>
                 <a:ea typeface="Calibri" panose="020F0502020204030204" pitchFamily="34" charset="0"/>
                 <a:cs typeface="Times New Roman" panose="02020603050405020304" pitchFamily="18" charset="0"/>
@@ -4760,7 +4664,7 @@
                 <a:buFont typeface="Arial" panose="020B0604020202020204" pitchFamily="34" charset="0"/>
                 <a:buChar char="•"/>
               </a:pPr>
-              <a:endParaRPr lang="en-US" sz="900" dirty="0">
+              <a:endParaRPr lang="en-US" sz="1000" dirty="0">
                 <a:latin typeface="Times New Roman" panose="02020603050405020304" pitchFamily="18" charset="0"/>
                 <a:ea typeface="Calibri" panose="020F0502020204030204" pitchFamily="34" charset="0"/>
                 <a:cs typeface="Times New Roman" panose="02020603050405020304" pitchFamily="18" charset="0"/>
@@ -4820,7 +4724,7 @@
                 </a:spcAft>
               </a:pPr>
               <a:r>
-                <a:rPr lang="en-US" sz="900" dirty="0">
+                <a:rPr lang="en-US" sz="1000" dirty="0">
                   <a:effectLst/>
                   <a:latin typeface="Times New Roman" panose="02020603050405020304" pitchFamily="18" charset="0"/>
                   <a:ea typeface="Calibri" panose="020F0502020204030204" pitchFamily="34" charset="0"/>
@@ -4841,7 +4745,7 @@
                 <a:buChar char="•"/>
               </a:pPr>
               <a:r>
-                <a:rPr lang="en-US" sz="900" dirty="0">
+                <a:rPr lang="en-US" sz="1000" dirty="0">
                   <a:effectLst/>
                   <a:latin typeface="Times New Roman" panose="02020603050405020304" pitchFamily="18" charset="0"/>
                   <a:ea typeface="Calibri" panose="020F0502020204030204" pitchFamily="34" charset="0"/>
@@ -4862,7 +4766,7 @@
                 <a:buChar char="•"/>
               </a:pPr>
               <a:r>
-                <a:rPr lang="en-US" sz="900" dirty="0">
+                <a:rPr lang="en-US" sz="1000" dirty="0">
                   <a:latin typeface="Times New Roman" panose="02020603050405020304" pitchFamily="18" charset="0"/>
                   <a:ea typeface="Calibri" panose="020F0502020204030204" pitchFamily="34" charset="0"/>
                   <a:cs typeface="Times New Roman" panose="02020603050405020304" pitchFamily="18" charset="0"/>
@@ -4882,7 +4786,7 @@
                 <a:buChar char="•"/>
               </a:pPr>
               <a:r>
-                <a:rPr lang="en-US" sz="900" dirty="0">
+                <a:rPr lang="en-US" sz="1000" dirty="0">
                   <a:effectLst/>
                   <a:latin typeface="Times New Roman" panose="02020603050405020304" pitchFamily="18" charset="0"/>
                   <a:ea typeface="Calibri" panose="020F0502020204030204" pitchFamily="34" charset="0"/>
@@ -4905,7 +4809,7 @@
                 <a:buFont typeface="Arial" panose="020B0604020202020204" pitchFamily="34" charset="0"/>
                 <a:buChar char="•"/>
               </a:pPr>
-              <a:endParaRPr lang="en-US" sz="900" dirty="0">
+              <a:endParaRPr lang="en-US" sz="1000" dirty="0">
                 <a:effectLst/>
                 <a:latin typeface="Times New Roman" panose="02020603050405020304" pitchFamily="18" charset="0"/>
                 <a:ea typeface="Calibri" panose="020F0502020204030204" pitchFamily="34" charset="0"/>
@@ -4942,8 +4846,8 @@
         </p:blipFill>
         <p:spPr>
           <a:xfrm>
-            <a:off x="8625017" y="1788302"/>
-            <a:ext cx="3372318" cy="454531"/>
+            <a:off x="8625017" y="1788303"/>
+            <a:ext cx="3372318" cy="337678"/>
           </a:xfrm>
           <a:prstGeom prst="rect">
             <a:avLst/>
@@ -4977,8 +4881,8 @@
         </p:blipFill>
         <p:spPr>
           <a:xfrm>
-            <a:off x="8608305" y="3737563"/>
-            <a:ext cx="3483605" cy="1042808"/>
+            <a:off x="8625017" y="3859260"/>
+            <a:ext cx="3483605" cy="710435"/>
           </a:xfrm>
           <a:prstGeom prst="rect">
             <a:avLst/>
@@ -5001,7 +4905,7 @@
         </p:nvSpPr>
         <p:spPr bwMode="auto">
           <a:xfrm>
-            <a:off x="8543873" y="5484573"/>
+            <a:off x="8543873" y="5383208"/>
             <a:ext cx="3623020" cy="260939"/>
           </a:xfrm>
           <a:prstGeom prst="rect">
@@ -5064,17 +4968,17 @@
               </a:spcAft>
             </a:pPr>
             <a:r>
-              <a:rPr lang="en-US" sz="1800" b="1" dirty="0">
+              <a:rPr lang="en-US" sz="1400" b="1" dirty="0">
                 <a:effectLst/>
-                <a:latin typeface="Calibri" panose="020F0502020204030204" pitchFamily="34" charset="0"/>
+                <a:latin typeface="Times New Roman" panose="02020603050405020304" pitchFamily="18" charset="0"/>
                 <a:ea typeface="Calibri" panose="020F0502020204030204" pitchFamily="34" charset="0"/>
                 <a:cs typeface="Times New Roman" panose="02020603050405020304" pitchFamily="18" charset="0"/>
               </a:rPr>
               <a:t> </a:t>
             </a:r>
-            <a:endParaRPr lang="en-US" sz="1100" dirty="0">
+            <a:endParaRPr lang="en-US" sz="1400" dirty="0">
               <a:effectLst/>
-              <a:latin typeface="Calibri" panose="020F0502020204030204" pitchFamily="34" charset="0"/>
+              <a:latin typeface="Times New Roman" panose="02020603050405020304" pitchFamily="18" charset="0"/>
               <a:ea typeface="Calibri" panose="020F0502020204030204" pitchFamily="34" charset="0"/>
               <a:cs typeface="Times New Roman" panose="02020603050405020304" pitchFamily="18" charset="0"/>
             </a:endParaRPr>
@@ -5097,8 +5001,8 @@
         </p:nvSpPr>
         <p:spPr bwMode="auto">
           <a:xfrm>
-            <a:off x="8543873" y="5800272"/>
-            <a:ext cx="3615988" cy="981014"/>
+            <a:off x="8543873" y="5723704"/>
+            <a:ext cx="3615988" cy="1057582"/>
           </a:xfrm>
           <a:prstGeom prst="rect">
             <a:avLst/>
@@ -5222,7 +5126,7 @@
         </p:nvSpPr>
         <p:spPr>
           <a:xfrm>
-            <a:off x="6862756" y="4934018"/>
+            <a:off x="6871212" y="5033684"/>
             <a:ext cx="1578634" cy="246221"/>
           </a:xfrm>
           <a:prstGeom prst="rect">
@@ -5245,52 +5149,6 @@
       </p:sp>
       <p:sp>
         <p:nvSpPr>
-          <p:cNvPr id="2062" name="Rectangle 2061">
-            <a:extLst>
-              <a:ext uri="{FF2B5EF4-FFF2-40B4-BE49-F238E27FC236}">
-                <a16:creationId xmlns:a16="http://schemas.microsoft.com/office/drawing/2014/main" id="{77A48175-4E8B-40B1-B147-B3D22424088E}"/>
-              </a:ext>
-            </a:extLst>
-          </p:cNvPr>
-          <p:cNvSpPr/>
-          <p:nvPr/>
-        </p:nvSpPr>
-        <p:spPr>
-          <a:xfrm>
-            <a:off x="7777252" y="4985922"/>
-            <a:ext cx="488295" cy="378604"/>
-          </a:xfrm>
-          <a:prstGeom prst="rect">
-            <a:avLst/>
-          </a:prstGeom>
-        </p:spPr>
-        <p:style>
-          <a:lnRef idx="2">
-            <a:schemeClr val="accent1">
-              <a:shade val="50000"/>
-            </a:schemeClr>
-          </a:lnRef>
-          <a:fillRef idx="1">
-            <a:schemeClr val="accent1"/>
-          </a:fillRef>
-          <a:effectRef idx="0">
-            <a:schemeClr val="accent1"/>
-          </a:effectRef>
-          <a:fontRef idx="minor">
-            <a:schemeClr val="lt1"/>
-          </a:fontRef>
-        </p:style>
-        <p:txBody>
-          <a:bodyPr rtlCol="0" anchor="ctr"/>
-          <a:lstStyle/>
-          <a:p>
-            <a:pPr algn="ctr"/>
-            <a:endParaRPr lang="en-US"/>
-          </a:p>
-        </p:txBody>
-      </p:sp>
-      <p:sp>
-        <p:nvSpPr>
           <p:cNvPr id="68" name="Text Box 2">
             <a:extLst>
               <a:ext uri="{FF2B5EF4-FFF2-40B4-BE49-F238E27FC236}">
@@ -5305,8 +5163,8 @@
         </p:nvSpPr>
         <p:spPr bwMode="auto">
           <a:xfrm>
-            <a:off x="-615471" y="5354104"/>
-            <a:ext cx="3605440" cy="260939"/>
+            <a:off x="-612339" y="5354104"/>
+            <a:ext cx="3602308" cy="260939"/>
           </a:xfrm>
           <a:prstGeom prst="rect">
             <a:avLst/>
@@ -5351,7 +5209,7 @@
             </a:r>
             <a:endParaRPr lang="en-US" sz="1400" dirty="0">
               <a:effectLst/>
-              <a:latin typeface="Calibri" panose="020F0502020204030204" pitchFamily="34" charset="0"/>
+              <a:latin typeface="Times New Roman" panose="02020603050405020304" pitchFamily="18" charset="0"/>
               <a:ea typeface="Calibri" panose="020F0502020204030204" pitchFamily="34" charset="0"/>
               <a:cs typeface="Times New Roman" panose="02020603050405020304" pitchFamily="18" charset="0"/>
             </a:endParaRPr>
@@ -5374,8 +5232,8 @@
         </p:nvSpPr>
         <p:spPr bwMode="auto">
           <a:xfrm>
-            <a:off x="-617229" y="5668813"/>
-            <a:ext cx="3623020" cy="1071182"/>
+            <a:off x="-617229" y="5668812"/>
+            <a:ext cx="3602307" cy="1112473"/>
           </a:xfrm>
           <a:prstGeom prst="rect">
             <a:avLst/>
@@ -5404,12 +5262,12 @@
               </a:spcBef>
             </a:pPr>
             <a:r>
-              <a:rPr lang="en-US" sz="900" dirty="0">
+              <a:rPr lang="en-US" sz="1000" dirty="0">
                 <a:latin typeface="Times New Roman" panose="02020603050405020304" pitchFamily="18" charset="0"/>
                 <a:ea typeface="Calibri" panose="020F0502020204030204" pitchFamily="34" charset="0"/>
                 <a:cs typeface="Times New Roman" panose="02020603050405020304" pitchFamily="18" charset="0"/>
               </a:rPr>
-              <a:t>While there are almost limitless possibilities to add next some of the simpler developments, I plan on making include:</a:t>
+              <a:t>While there are almost limitless possibilities to add next, some of the simpler developments I plan on making include:</a:t>
             </a:r>
           </a:p>
           <a:p>
@@ -5421,26 +5279,13 @@
               <a:buChar char="•"/>
             </a:pPr>
             <a:r>
-              <a:rPr lang="en-US" sz="900" dirty="0">
+              <a:rPr lang="en-US" sz="1000" dirty="0">
                 <a:latin typeface="Times New Roman" panose="02020603050405020304" pitchFamily="18" charset="0"/>
                 <a:ea typeface="Calibri" panose="020F0502020204030204" pitchFamily="34" charset="0"/>
                 <a:cs typeface="Times New Roman" panose="02020603050405020304" pitchFamily="18" charset="0"/>
               </a:rPr>
-              <a:t>Implementing a closest pair of points algorithm in order to maximize </a:t>
-            </a:r>
-            <a:r>
-              <a:rPr lang="en-US" sz="900" dirty="0" err="1">
-                <a:latin typeface="Times New Roman" panose="02020603050405020304" pitchFamily="18" charset="0"/>
-                <a:ea typeface="Calibri" panose="020F0502020204030204" pitchFamily="34" charset="0"/>
-                <a:cs typeface="Times New Roman" panose="02020603050405020304" pitchFamily="18" charset="0"/>
-              </a:rPr>
-              <a:t>effieciency</a:t>
-            </a:r>
-            <a:endParaRPr lang="en-US" sz="900" dirty="0">
-              <a:latin typeface="Times New Roman" panose="02020603050405020304" pitchFamily="18" charset="0"/>
-              <a:ea typeface="Calibri" panose="020F0502020204030204" pitchFamily="34" charset="0"/>
-              <a:cs typeface="Times New Roman" panose="02020603050405020304" pitchFamily="18" charset="0"/>
-            </a:endParaRPr>
+              <a:t>Implementing a closest pair of points algorithm in order to maximize efficiency</a:t>
+            </a:r>
           </a:p>
           <a:p>
             <a:pPr marL="171450" marR="0" indent="-171450">
@@ -5454,7 +5299,7 @@
               <a:buChar char="•"/>
             </a:pPr>
             <a:r>
-              <a:rPr lang="en-US" sz="900" dirty="0">
+              <a:rPr lang="en-US" sz="1000" dirty="0">
                 <a:latin typeface="Times New Roman" panose="02020603050405020304" pitchFamily="18" charset="0"/>
                 <a:ea typeface="Calibri" panose="020F0502020204030204" pitchFamily="34" charset="0"/>
                 <a:cs typeface="Times New Roman" panose="02020603050405020304" pitchFamily="18" charset="0"/>
@@ -5474,7 +5319,7 @@
               <a:buChar char="•"/>
             </a:pPr>
             <a:r>
-              <a:rPr lang="en-US" sz="900" dirty="0">
+              <a:rPr lang="en-US" sz="1000" dirty="0">
                 <a:latin typeface="Times New Roman" panose="02020603050405020304" pitchFamily="18" charset="0"/>
                 <a:ea typeface="Calibri" panose="020F0502020204030204" pitchFamily="34" charset="0"/>
                 <a:cs typeface="Times New Roman" panose="02020603050405020304" pitchFamily="18" charset="0"/>
@@ -5500,8 +5345,8 @@
         </p:nvSpPr>
         <p:spPr bwMode="auto">
           <a:xfrm>
-            <a:off x="3203748" y="5620401"/>
-            <a:ext cx="5149198" cy="250221"/>
+            <a:off x="3201113" y="5620401"/>
+            <a:ext cx="5151833" cy="250221"/>
           </a:xfrm>
           <a:prstGeom prst="rect">
             <a:avLst/>
@@ -5546,7 +5391,7 @@
             </a:r>
             <a:endParaRPr lang="en-US" sz="1400" dirty="0">
               <a:effectLst/>
-              <a:latin typeface="Calibri" panose="020F0502020204030204" pitchFamily="34" charset="0"/>
+              <a:latin typeface="Times New Roman" panose="02020603050405020304" pitchFamily="18" charset="0"/>
               <a:ea typeface="Calibri" panose="020F0502020204030204" pitchFamily="34" charset="0"/>
               <a:cs typeface="Times New Roman" panose="02020603050405020304" pitchFamily="18" charset="0"/>
             </a:endParaRPr>
@@ -5569,8 +5414,8 @@
         </p:nvSpPr>
         <p:spPr bwMode="auto">
           <a:xfrm>
-            <a:off x="3194957" y="5922526"/>
-            <a:ext cx="5149198" cy="822927"/>
+            <a:off x="3201113" y="5922526"/>
+            <a:ext cx="5143042" cy="872563"/>
           </a:xfrm>
           <a:prstGeom prst="rect">
             <a:avLst/>
@@ -5605,7 +5450,7 @@
               </a:spcAft>
             </a:pPr>
             <a:r>
-              <a:rPr lang="en-US" sz="900" dirty="0">
+              <a:rPr lang="en-US" sz="1000" dirty="0">
                 <a:effectLst/>
                 <a:latin typeface="Times New Roman" panose="02020603050405020304" pitchFamily="18" charset="0"/>
                 <a:ea typeface="Calibri" panose="020F0502020204030204" pitchFamily="34" charset="0"/>
@@ -5614,12 +5459,12 @@
               <a:t>The </a:t>
             </a:r>
             <a:r>
-              <a:rPr lang="en-US" sz="900" dirty="0">
+              <a:rPr lang="en-US" sz="1000" dirty="0">
                 <a:latin typeface="Times New Roman" panose="02020603050405020304" pitchFamily="18" charset="0"/>
                 <a:ea typeface="Calibri" panose="020F0502020204030204" pitchFamily="34" charset="0"/>
                 <a:cs typeface="Times New Roman" panose="02020603050405020304" pitchFamily="18" charset="0"/>
               </a:rPr>
-              <a:t>design of my physics engine was like that of Unity’s. Each object has both a rigid body and a collision script attached. The rigid body script handles the physics operations such as velocity and gravity, where the collision script handles collisions. The idea behind the scripts was to have each object knowing how to react to what is happening to it rather than having one observer that handles all the collisions itself. This was to best simulate real-world physics.</a:t>
+              <a:t>design of my physics engine was like that of Unity’s. Each object has both a rigid body and a collision script attached. The rigid body script handles the physics operations such as velocity and gravity, where the collision script handles collisions. Each component factors in it’s own velocity, mass, and position as well as that of which it is interacting with to computes it’s own values for the next frame.</a:t>
             </a:r>
           </a:p>
           <a:p>
@@ -5634,48 +5479,14 @@
                 <a:spcPts val="800"/>
               </a:spcAft>
             </a:pPr>
-            <a:endParaRPr lang="en-US" sz="900" dirty="0">
-              <a:effectLst/>
-              <a:latin typeface="Times New Roman" panose="02020603050405020304" pitchFamily="18" charset="0"/>
-              <a:ea typeface="Calibri" panose="020F0502020204030204" pitchFamily="34" charset="0"/>
-              <a:cs typeface="Times New Roman" panose="02020603050405020304" pitchFamily="18" charset="0"/>
-            </a:endParaRPr>
-          </a:p>
-          <a:p>
-            <a:pPr marL="0" marR="0">
-              <a:lnSpc>
-                <a:spcPct val="107000"/>
-              </a:lnSpc>
-              <a:spcBef>
-                <a:spcPts val="0"/>
-              </a:spcBef>
-              <a:spcAft>
-                <a:spcPts val="800"/>
-              </a:spcAft>
-            </a:pPr>
-            <a:endParaRPr lang="en-US" sz="900" dirty="0">
-              <a:latin typeface="Times New Roman" panose="02020603050405020304" pitchFamily="18" charset="0"/>
-              <a:ea typeface="Calibri" panose="020F0502020204030204" pitchFamily="34" charset="0"/>
-              <a:cs typeface="Times New Roman" panose="02020603050405020304" pitchFamily="18" charset="0"/>
-            </a:endParaRPr>
-          </a:p>
-          <a:p>
-            <a:pPr marL="0" marR="0">
-              <a:lnSpc>
-                <a:spcPct val="107000"/>
-              </a:lnSpc>
-              <a:spcBef>
-                <a:spcPts val="0"/>
-              </a:spcBef>
-              <a:spcAft>
-                <a:spcPts val="800"/>
-              </a:spcAft>
-            </a:pPr>
-            <a:endParaRPr lang="en-US" sz="900" dirty="0">
-              <a:latin typeface="Times New Roman" panose="02020603050405020304" pitchFamily="18" charset="0"/>
-              <a:ea typeface="Calibri" panose="020F0502020204030204" pitchFamily="34" charset="0"/>
-              <a:cs typeface="Times New Roman" panose="02020603050405020304" pitchFamily="18" charset="0"/>
-            </a:endParaRPr>
+            <a:r>
+              <a:rPr lang="en-US" sz="1000" dirty="0">
+                <a:latin typeface="Times New Roman" panose="02020603050405020304" pitchFamily="18" charset="0"/>
+                <a:ea typeface="Calibri" panose="020F0502020204030204" pitchFamily="34" charset="0"/>
+                <a:cs typeface="Times New Roman" panose="02020603050405020304" pitchFamily="18" charset="0"/>
+              </a:rPr>
+              <a:t> </a:t>
+            </a:r>
           </a:p>
         </p:txBody>
       </p:sp>
@@ -5701,13 +5512,13 @@
               </a:ext>
             </a:extLst>
           </a:blip>
-          <a:srcRect l="25473" t="28899" r="25049" b="12253"/>
+          <a:srcRect l="25473" t="28774" r="25049" b="12254"/>
           <a:stretch/>
         </p:blipFill>
         <p:spPr>
           <a:xfrm>
-            <a:off x="3371969" y="4079722"/>
-            <a:ext cx="1908432" cy="1173469"/>
+            <a:off x="3383763" y="4044906"/>
+            <a:ext cx="1895430" cy="1175945"/>
           </a:xfrm>
           <a:prstGeom prst="rect">
             <a:avLst/>
@@ -5716,7 +5527,7 @@
       </p:pic>
       <p:pic>
         <p:nvPicPr>
-          <p:cNvPr id="9" name="Picture 8" descr="A screenshot of a video game&#10;&#10;Description automatically generated">
+          <p:cNvPr id="9" name="Picture 8">
             <a:extLst>
               <a:ext uri="{FF2B5EF4-FFF2-40B4-BE49-F238E27FC236}">
                 <a16:creationId xmlns:a16="http://schemas.microsoft.com/office/drawing/2014/main" id="{C783B34E-951C-4455-9BAB-A7F451C40AB3}"/>
@@ -5736,14 +5547,13 @@
               </a:ext>
             </a:extLst>
           </a:blip>
-          <a:stretch>
-            <a:fillRect/>
-          </a:stretch>
+          <a:srcRect/>
+          <a:stretch/>
         </p:blipFill>
         <p:spPr>
           <a:xfrm>
-            <a:off x="3383250" y="1303027"/>
-            <a:ext cx="1898958" cy="1173469"/>
+            <a:off x="3396161" y="1303027"/>
+            <a:ext cx="1871588" cy="1173469"/>
           </a:xfrm>
           <a:prstGeom prst="rect">
             <a:avLst/>
@@ -5752,10 +5562,45 @@
       </p:pic>
       <p:pic>
         <p:nvPicPr>
-          <p:cNvPr id="13" name="Picture 12" descr="A screenshot of a cell phone&#10;&#10;Description automatically generated">
+          <p:cNvPr id="13" name="Picture 12">
             <a:extLst>
               <a:ext uri="{FF2B5EF4-FFF2-40B4-BE49-F238E27FC236}">
                 <a16:creationId xmlns:a16="http://schemas.microsoft.com/office/drawing/2014/main" id="{AAE2018C-29ED-415A-A664-A03B1DC3515B}"/>
+              </a:ext>
+            </a:extLst>
+          </p:cNvPr>
+          <p:cNvPicPr>
+            <a:picLocks noChangeAspect="1"/>
+          </p:cNvPicPr>
+          <p:nvPr/>
+        </p:nvPicPr>
+        <p:blipFill rotWithShape="1">
+          <a:blip r:embed="rId7">
+            <a:extLst>
+              <a:ext uri="{28A0092B-C50C-407E-A947-70E740481C1C}">
+                <a14:useLocalDpi xmlns:a14="http://schemas.microsoft.com/office/drawing/2010/main" val="0"/>
+              </a:ext>
+            </a:extLst>
+          </a:blip>
+          <a:srcRect l="345" r="717" b="943"/>
+          <a:stretch/>
+        </p:blipFill>
+        <p:spPr>
+          <a:xfrm>
+            <a:off x="3384971" y="2683315"/>
+            <a:ext cx="1895430" cy="1175945"/>
+          </a:xfrm>
+          <a:prstGeom prst="rect">
+            <a:avLst/>
+          </a:prstGeom>
+        </p:spPr>
+      </p:pic>
+      <p:pic>
+        <p:nvPicPr>
+          <p:cNvPr id="4" name="Picture 3" descr="A black and silver text on a white surface&#10;&#10;Description automatically generated">
+            <a:extLst>
+              <a:ext uri="{FF2B5EF4-FFF2-40B4-BE49-F238E27FC236}">
+                <a16:creationId xmlns:a16="http://schemas.microsoft.com/office/drawing/2014/main" id="{9E24E5AA-6F45-4465-9C53-E0F677DB1A28}"/>
               </a:ext>
             </a:extLst>
           </p:cNvPr>
@@ -5765,7 +5610,7 @@
           <p:nvPr/>
         </p:nvPicPr>
         <p:blipFill>
-          <a:blip r:embed="rId7">
+          <a:blip r:embed="rId8">
             <a:extLst>
               <a:ext uri="{28A0092B-C50C-407E-A947-70E740481C1C}">
                 <a14:useLocalDpi xmlns:a14="http://schemas.microsoft.com/office/drawing/2010/main" val="0"/>
@@ -5778,8 +5623,8 @@
         </p:blipFill>
         <p:spPr>
           <a:xfrm>
-            <a:off x="3376706" y="2683315"/>
-            <a:ext cx="1898958" cy="1189588"/>
+            <a:off x="7814993" y="4873096"/>
+            <a:ext cx="510112" cy="510112"/>
           </a:xfrm>
           <a:prstGeom prst="rect">
             <a:avLst/>
@@ -6095,21 +5940,6 @@
 </file>
 
 <file path=customXml/item1.xml><?xml version="1.0" encoding="utf-8"?>
-<p:properties xmlns:p="http://schemas.microsoft.com/office/2006/metadata/properties" xmlns:xsi="http://www.w3.org/2001/XMLSchema-instance" xmlns:pc="http://schemas.microsoft.com/office/infopath/2007/PartnerControls">
-  <documentManagement/>
-</p:properties>
-</file>
-
-<file path=customXml/item2.xml><?xml version="1.0" encoding="utf-8"?>
-<?mso-contentType ?>
-<FormTemplates xmlns="http://schemas.microsoft.com/sharepoint/v3/contenttype/forms">
-  <Display>DocumentLibraryForm</Display>
-  <Edit>DocumentLibraryForm</Edit>
-  <New>DocumentLibraryForm</New>
-</FormTemplates>
-</file>
-
-<file path=customXml/item3.xml><?xml version="1.0" encoding="utf-8"?>
 <ct:contentTypeSchema xmlns:ct="http://schemas.microsoft.com/office/2006/metadata/contentType" xmlns:ma="http://schemas.microsoft.com/office/2006/metadata/properties/metaAttributes" ct:_="" ma:_="" ma:contentTypeName="Document" ma:contentTypeID="0x0101001721046BF24F6F4DABC82765333C01E2" ma:contentTypeVersion="8" ma:contentTypeDescription="Create a new document." ma:contentTypeScope="" ma:versionID="ca789c8f004f230c1e27c5932e949dc2">
   <xsd:schema xmlns:xsd="http://www.w3.org/2001/XMLSchema" xmlns:xs="http://www.w3.org/2001/XMLSchema" xmlns:p="http://schemas.microsoft.com/office/2006/metadata/properties" xmlns:ns3="6ff2565f-bfa1-4847-8911-4f2c78edaf9e" targetNamespace="http://schemas.microsoft.com/office/2006/metadata/properties" ma:root="true" ma:fieldsID="69a90238aa7e61cc026899f4d84b9cbf" ns3:_="">
     <xsd:import namespace="6ff2565f-bfa1-4847-8911-4f2c78edaf9e"/>
@@ -6281,24 +6111,22 @@
 </ct:contentTypeSchema>
 </file>
 
-<file path=customXml/itemProps1.xml><?xml version="1.0" encoding="utf-8"?>
-<ds:datastoreItem xmlns:ds="http://schemas.openxmlformats.org/officeDocument/2006/customXml" ds:itemID="{D4BCA305-4EB3-4274-AC44-481D46CD6DF8}">
-  <ds:schemaRefs>
-    <ds:schemaRef ds:uri="http://schemas.microsoft.com/office/2006/metadata/properties"/>
-    <ds:schemaRef ds:uri="http://schemas.microsoft.com/office/infopath/2007/PartnerControls"/>
-  </ds:schemaRefs>
-</ds:datastoreItem>
+<file path=customXml/item2.xml><?xml version="1.0" encoding="utf-8"?>
+<?mso-contentType ?>
+<FormTemplates xmlns="http://schemas.microsoft.com/sharepoint/v3/contenttype/forms">
+  <Display>DocumentLibraryForm</Display>
+  <Edit>DocumentLibraryForm</Edit>
+  <New>DocumentLibraryForm</New>
+</FormTemplates>
 </file>
 
-<file path=customXml/itemProps2.xml><?xml version="1.0" encoding="utf-8"?>
-<ds:datastoreItem xmlns:ds="http://schemas.openxmlformats.org/officeDocument/2006/customXml" ds:itemID="{1BA666D6-D48D-40C1-B74A-C12A8D535C49}">
-  <ds:schemaRefs>
-    <ds:schemaRef ds:uri="http://schemas.microsoft.com/sharepoint/v3/contenttype/forms"/>
-  </ds:schemaRefs>
-</ds:datastoreItem>
+<file path=customXml/item3.xml><?xml version="1.0" encoding="utf-8"?>
+<p:properties xmlns:p="http://schemas.microsoft.com/office/2006/metadata/properties" xmlns:xsi="http://www.w3.org/2001/XMLSchema-instance" xmlns:pc="http://schemas.microsoft.com/office/infopath/2007/PartnerControls">
+  <documentManagement/>
+</p:properties>
 </file>
 
-<file path=customXml/itemProps3.xml><?xml version="1.0" encoding="utf-8"?>
+<file path=customXml/itemProps1.xml><?xml version="1.0" encoding="utf-8"?>
 <ds:datastoreItem xmlns:ds="http://schemas.openxmlformats.org/officeDocument/2006/customXml" ds:itemID="{368B78D7-4FC2-4289-9251-EF4FBB231F20}">
   <ds:schemaRefs>
     <ds:schemaRef ds:uri="http://schemas.microsoft.com/office/2006/metadata/contentType"/>
@@ -6314,4 +6142,21 @@
     <ds:schemaRef ds:uri="http://schemas.microsoft.com/internal/obd"/>
   </ds:schemaRefs>
 </ds:datastoreItem>
+</file>
+
+<file path=customXml/itemProps2.xml><?xml version="1.0" encoding="utf-8"?>
+<ds:datastoreItem xmlns:ds="http://schemas.openxmlformats.org/officeDocument/2006/customXml" ds:itemID="{1BA666D6-D48D-40C1-B74A-C12A8D535C49}">
+  <ds:schemaRefs>
+    <ds:schemaRef ds:uri="http://schemas.microsoft.com/sharepoint/v3/contenttype/forms"/>
+  </ds:schemaRefs>
+</ds:datastoreItem>
+</file>
+
+<file path=customXml/itemProps3.xml><?xml version="1.0" encoding="utf-8"?>
+<ds:datastoreItem xmlns:ds="http://schemas.openxmlformats.org/officeDocument/2006/customXml" ds:itemID="{D4BCA305-4EB3-4274-AC44-481D46CD6DF8}">
+  <ds:schemaRefs>
+    <ds:schemaRef ds:uri="http://schemas.microsoft.com/office/2006/metadata/properties"/>
+    <ds:schemaRef ds:uri="http://schemas.microsoft.com/office/infopath/2007/PartnerControls"/>
+  </ds:schemaRefs>
+</ds:datastoreItem>
 </file>
</xml_diff>